<commit_message>
change title to web user profiling using data redundancy
</commit_message>
<xml_diff>
--- a/ASONAM16/web-user-profiling.pptx
+++ b/ASONAM16/web-user-profiling.pptx
@@ -14,12 +14,12 @@
     <p:sldId id="256" r:id="rId2"/>
     <p:sldId id="711" r:id="rId3"/>
     <p:sldId id="712" r:id="rId4"/>
-    <p:sldId id="829" r:id="rId5"/>
+    <p:sldId id="834" r:id="rId5"/>
     <p:sldId id="794" r:id="rId6"/>
     <p:sldId id="795" r:id="rId7"/>
     <p:sldId id="796" r:id="rId8"/>
     <p:sldId id="797" r:id="rId9"/>
-    <p:sldId id="830" r:id="rId10"/>
+    <p:sldId id="835" r:id="rId10"/>
     <p:sldId id="801" r:id="rId11"/>
     <p:sldId id="828" r:id="rId12"/>
     <p:sldId id="827" r:id="rId13"/>
@@ -31,7 +31,7 @@
     <p:sldId id="807" r:id="rId19"/>
     <p:sldId id="812" r:id="rId20"/>
     <p:sldId id="813" r:id="rId21"/>
-    <p:sldId id="831" r:id="rId22"/>
+    <p:sldId id="836" r:id="rId22"/>
     <p:sldId id="811" r:id="rId23"/>
     <p:sldId id="818" r:id="rId24"/>
     <p:sldId id="814" r:id="rId25"/>
@@ -39,10 +39,10 @@
     <p:sldId id="817" r:id="rId27"/>
     <p:sldId id="819" r:id="rId28"/>
     <p:sldId id="820" r:id="rId29"/>
-    <p:sldId id="832" r:id="rId30"/>
+    <p:sldId id="837" r:id="rId30"/>
     <p:sldId id="822" r:id="rId31"/>
     <p:sldId id="823" r:id="rId32"/>
-    <p:sldId id="833" r:id="rId33"/>
+    <p:sldId id="838" r:id="rId33"/>
     <p:sldId id="825" r:id="rId34"/>
     <p:sldId id="826" r:id="rId35"/>
   </p:sldIdLst>
@@ -275,7 +275,7 @@
             <a:fld id="{FEB3ECEE-0D21-4F07-BB2D-93D9E09592DF}" type="datetimeFigureOut">
               <a:rPr lang="zh-CN" altLang="en-US" smtClean="0"/>
               <a:pPr/>
-              <a:t>16/8/10</a:t>
+              <a:t>16/8/20</a:t>
             </a:fld>
             <a:endParaRPr lang="zh-CN" altLang="en-US"/>
           </a:p>
@@ -4100,6 +4100,82 @@
                 <a:cs typeface="Helvetica Neue" charset="0"/>
               </a:rPr>
               <a:t>Profiling</a:t>
+            </a:r>
+            <a:r>
+              <a:rPr lang="zh-CN" altLang="en-US" sz="4400" b="1" dirty="0">
+                <a:solidFill>
+                  <a:srgbClr val="C00000"/>
+                </a:solidFill>
+                <a:latin typeface="Helvetica Neue" charset="0"/>
+                <a:ea typeface="Helvetica Neue" charset="0"/>
+                <a:cs typeface="Helvetica Neue" charset="0"/>
+              </a:rPr>
+              <a:t/>
+            </a:r>
+            <a:br>
+              <a:rPr lang="zh-CN" altLang="en-US" sz="4400" b="1" dirty="0">
+                <a:solidFill>
+                  <a:srgbClr val="C00000"/>
+                </a:solidFill>
+                <a:latin typeface="Helvetica Neue" charset="0"/>
+                <a:ea typeface="Helvetica Neue" charset="0"/>
+                <a:cs typeface="Helvetica Neue" charset="0"/>
+              </a:rPr>
+            </a:br>
+            <a:r>
+              <a:rPr lang="en-US" altLang="zh-CN" sz="4400" b="1" dirty="0" smtClean="0">
+                <a:solidFill>
+                  <a:srgbClr val="C00000"/>
+                </a:solidFill>
+                <a:latin typeface="Helvetica Neue" charset="0"/>
+                <a:ea typeface="Helvetica Neue" charset="0"/>
+                <a:cs typeface="Helvetica Neue" charset="0"/>
+              </a:rPr>
+              <a:t>using</a:t>
+            </a:r>
+            <a:r>
+              <a:rPr lang="zh-CN" altLang="en-US" sz="4400" b="1" dirty="0" smtClean="0">
+                <a:solidFill>
+                  <a:srgbClr val="C00000"/>
+                </a:solidFill>
+                <a:latin typeface="Helvetica Neue" charset="0"/>
+                <a:ea typeface="Helvetica Neue" charset="0"/>
+                <a:cs typeface="Helvetica Neue" charset="0"/>
+              </a:rPr>
+              <a:t> </a:t>
+            </a:r>
+            <a:r>
+              <a:rPr lang="en-US" altLang="zh-CN" sz="4400" b="1" dirty="0" smtClean="0">
+                <a:solidFill>
+                  <a:srgbClr val="C00000"/>
+                </a:solidFill>
+                <a:latin typeface="Helvetica Neue" charset="0"/>
+                <a:ea typeface="Helvetica Neue" charset="0"/>
+                <a:cs typeface="Helvetica Neue" charset="0"/>
+              </a:rPr>
+              <a:t>Data</a:t>
+            </a:r>
+            <a:r>
+              <a:rPr lang="zh-CN" altLang="en-US" sz="4400" b="1" dirty="0" smtClean="0">
+                <a:solidFill>
+                  <a:srgbClr val="C00000"/>
+                </a:solidFill>
+                <a:latin typeface="Helvetica Neue" charset="0"/>
+                <a:ea typeface="Helvetica Neue" charset="0"/>
+                <a:cs typeface="Helvetica Neue" charset="0"/>
+              </a:rPr>
+              <a:t> </a:t>
+            </a:r>
+            <a:r>
+              <a:rPr lang="en-US" altLang="zh-CN" sz="4400" b="1" dirty="0" smtClean="0">
+                <a:solidFill>
+                  <a:srgbClr val="C00000"/>
+                </a:solidFill>
+                <a:latin typeface="Helvetica Neue" charset="0"/>
+                <a:ea typeface="Helvetica Neue" charset="0"/>
+                <a:cs typeface="Helvetica Neue" charset="0"/>
+              </a:rPr>
+              <a:t>Redundancy</a:t>
             </a:r>
             <a:r>
               <a:rPr lang="zh-CN" altLang="en-US" sz="4400" b="1" dirty="0" smtClean="0">
@@ -10994,8 +11070,8 @@
         </p:nvSpPr>
         <p:spPr>
           <a:xfrm>
-            <a:off x="765104" y="1124744"/>
-            <a:ext cx="4763227" cy="707886"/>
+            <a:off x="765104" y="764704"/>
+            <a:ext cx="6022803" cy="1323439"/>
           </a:xfrm>
           <a:prstGeom prst="rect">
             <a:avLst/>
@@ -11037,6 +11113,41 @@
                 <a:latin typeface="+mj-lt"/>
               </a:rPr>
               <a:t>Profiling</a:t>
+            </a:r>
+            <a:endParaRPr lang="zh-CN" altLang="en-US" sz="4000" b="1" dirty="0" smtClean="0">
+              <a:latin typeface="+mj-lt"/>
+            </a:endParaRPr>
+          </a:p>
+          <a:p>
+            <a:r>
+              <a:rPr lang="en-US" altLang="zh-CN" sz="4000" b="1" dirty="0" smtClean="0">
+                <a:latin typeface="+mj-lt"/>
+              </a:rPr>
+              <a:t>using</a:t>
+            </a:r>
+            <a:r>
+              <a:rPr lang="zh-CN" altLang="en-US" sz="4000" b="1" dirty="0" smtClean="0">
+                <a:latin typeface="+mj-lt"/>
+              </a:rPr>
+              <a:t> </a:t>
+            </a:r>
+            <a:r>
+              <a:rPr lang="en-US" altLang="zh-CN" sz="4000" b="1" dirty="0" smtClean="0">
+                <a:latin typeface="+mj-lt"/>
+              </a:rPr>
+              <a:t>Data</a:t>
+            </a:r>
+            <a:r>
+              <a:rPr lang="zh-CN" altLang="en-US" sz="4000" b="1" dirty="0" smtClean="0">
+                <a:latin typeface="+mj-lt"/>
+              </a:rPr>
+              <a:t> </a:t>
+            </a:r>
+            <a:r>
+              <a:rPr lang="en-US" altLang="zh-CN" sz="4000" b="1" dirty="0" smtClean="0">
+                <a:latin typeface="+mj-lt"/>
+              </a:rPr>
+              <a:t>Redundancy</a:t>
             </a:r>
             <a:endParaRPr lang="zh-CN" altLang="en-US" sz="4000" b="1" dirty="0" smtClean="0">
               <a:latin typeface="+mj-lt"/>
@@ -11571,8 +11682,8 @@
         </p:nvSpPr>
         <p:spPr>
           <a:xfrm>
-            <a:off x="765104" y="1124744"/>
-            <a:ext cx="4763227" cy="707886"/>
+            <a:off x="765104" y="764704"/>
+            <a:ext cx="6022803" cy="1323439"/>
           </a:xfrm>
           <a:prstGeom prst="rect">
             <a:avLst/>
@@ -11614,6 +11725,41 @@
                 <a:latin typeface="+mj-lt"/>
               </a:rPr>
               <a:t>Profiling</a:t>
+            </a:r>
+            <a:endParaRPr lang="zh-CN" altLang="en-US" sz="4000" b="1" dirty="0" smtClean="0">
+              <a:latin typeface="+mj-lt"/>
+            </a:endParaRPr>
+          </a:p>
+          <a:p>
+            <a:r>
+              <a:rPr lang="en-US" altLang="zh-CN" sz="4000" b="1" dirty="0" smtClean="0">
+                <a:latin typeface="+mj-lt"/>
+              </a:rPr>
+              <a:t>using</a:t>
+            </a:r>
+            <a:r>
+              <a:rPr lang="zh-CN" altLang="en-US" sz="4000" b="1" dirty="0" smtClean="0">
+                <a:latin typeface="+mj-lt"/>
+              </a:rPr>
+              <a:t> </a:t>
+            </a:r>
+            <a:r>
+              <a:rPr lang="en-US" altLang="zh-CN" sz="4000" b="1" dirty="0" smtClean="0">
+                <a:latin typeface="+mj-lt"/>
+              </a:rPr>
+              <a:t>Data</a:t>
+            </a:r>
+            <a:r>
+              <a:rPr lang="zh-CN" altLang="en-US" sz="4000" b="1" dirty="0" smtClean="0">
+                <a:latin typeface="+mj-lt"/>
+              </a:rPr>
+              <a:t> </a:t>
+            </a:r>
+            <a:r>
+              <a:rPr lang="en-US" altLang="zh-CN" sz="4000" b="1" dirty="0" smtClean="0">
+                <a:latin typeface="+mj-lt"/>
+              </a:rPr>
+              <a:t>Redundancy</a:t>
             </a:r>
             <a:endParaRPr lang="zh-CN" altLang="en-US" sz="4000" b="1" dirty="0" smtClean="0">
               <a:latin typeface="+mj-lt"/>
@@ -11755,7 +11901,7 @@
     </p:spTree>
     <p:extLst>
       <p:ext uri="{BB962C8B-B14F-4D97-AF65-F5344CB8AC3E}">
-        <p14:creationId xmlns:p14="http://schemas.microsoft.com/office/powerpoint/2010/main" val="1853269203"/>
+        <p14:creationId xmlns:p14="http://schemas.microsoft.com/office/powerpoint/2010/main" val="2045830550"/>
       </p:ext>
     </p:extLst>
   </p:cSld>
@@ -15730,8 +15876,8 @@
         </p:nvSpPr>
         <p:spPr>
           <a:xfrm>
-            <a:off x="765104" y="1124744"/>
-            <a:ext cx="4763227" cy="707886"/>
+            <a:off x="765104" y="764704"/>
+            <a:ext cx="6022803" cy="1323439"/>
           </a:xfrm>
           <a:prstGeom prst="rect">
             <a:avLst/>
@@ -15773,6 +15919,41 @@
                 <a:latin typeface="+mj-lt"/>
               </a:rPr>
               <a:t>Profiling</a:t>
+            </a:r>
+            <a:endParaRPr lang="zh-CN" altLang="en-US" sz="4000" b="1" dirty="0" smtClean="0">
+              <a:latin typeface="+mj-lt"/>
+            </a:endParaRPr>
+          </a:p>
+          <a:p>
+            <a:r>
+              <a:rPr lang="en-US" altLang="zh-CN" sz="4000" b="1" dirty="0" smtClean="0">
+                <a:latin typeface="+mj-lt"/>
+              </a:rPr>
+              <a:t>using</a:t>
+            </a:r>
+            <a:r>
+              <a:rPr lang="zh-CN" altLang="en-US" sz="4000" b="1" dirty="0" smtClean="0">
+                <a:latin typeface="+mj-lt"/>
+              </a:rPr>
+              <a:t> </a:t>
+            </a:r>
+            <a:r>
+              <a:rPr lang="en-US" altLang="zh-CN" sz="4000" b="1" dirty="0" smtClean="0">
+                <a:latin typeface="+mj-lt"/>
+              </a:rPr>
+              <a:t>Data</a:t>
+            </a:r>
+            <a:r>
+              <a:rPr lang="zh-CN" altLang="en-US" sz="4000" b="1" dirty="0" smtClean="0">
+                <a:latin typeface="+mj-lt"/>
+              </a:rPr>
+              <a:t> </a:t>
+            </a:r>
+            <a:r>
+              <a:rPr lang="en-US" altLang="zh-CN" sz="4000" b="1" dirty="0" smtClean="0">
+                <a:latin typeface="+mj-lt"/>
+              </a:rPr>
+              <a:t>Redundancy</a:t>
             </a:r>
             <a:endParaRPr lang="zh-CN" altLang="en-US" sz="4000" b="1" dirty="0" smtClean="0">
               <a:latin typeface="+mj-lt"/>
@@ -15914,7 +16095,7 @@
     </p:spTree>
     <p:extLst>
       <p:ext uri="{BB962C8B-B14F-4D97-AF65-F5344CB8AC3E}">
-        <p14:creationId xmlns:p14="http://schemas.microsoft.com/office/powerpoint/2010/main" val="136047148"/>
+        <p14:creationId xmlns:p14="http://schemas.microsoft.com/office/powerpoint/2010/main" val="487565288"/>
       </p:ext>
     </p:extLst>
   </p:cSld>
@@ -18060,8 +18241,8 @@
         </p:nvSpPr>
         <p:spPr>
           <a:xfrm>
-            <a:off x="765104" y="1124744"/>
-            <a:ext cx="4763227" cy="707886"/>
+            <a:off x="765104" y="764704"/>
+            <a:ext cx="6022803" cy="1323439"/>
           </a:xfrm>
           <a:prstGeom prst="rect">
             <a:avLst/>
@@ -18103,6 +18284,41 @@
                 <a:latin typeface="+mj-lt"/>
               </a:rPr>
               <a:t>Profiling</a:t>
+            </a:r>
+            <a:endParaRPr lang="zh-CN" altLang="en-US" sz="4000" b="1" dirty="0" smtClean="0">
+              <a:latin typeface="+mj-lt"/>
+            </a:endParaRPr>
+          </a:p>
+          <a:p>
+            <a:r>
+              <a:rPr lang="en-US" altLang="zh-CN" sz="4000" b="1" dirty="0" smtClean="0">
+                <a:latin typeface="+mj-lt"/>
+              </a:rPr>
+              <a:t>using</a:t>
+            </a:r>
+            <a:r>
+              <a:rPr lang="zh-CN" altLang="en-US" sz="4000" b="1" dirty="0" smtClean="0">
+                <a:latin typeface="+mj-lt"/>
+              </a:rPr>
+              <a:t> </a:t>
+            </a:r>
+            <a:r>
+              <a:rPr lang="en-US" altLang="zh-CN" sz="4000" b="1" dirty="0" smtClean="0">
+                <a:latin typeface="+mj-lt"/>
+              </a:rPr>
+              <a:t>Data</a:t>
+            </a:r>
+            <a:r>
+              <a:rPr lang="zh-CN" altLang="en-US" sz="4000" b="1" dirty="0" smtClean="0">
+                <a:latin typeface="+mj-lt"/>
+              </a:rPr>
+              <a:t> </a:t>
+            </a:r>
+            <a:r>
+              <a:rPr lang="en-US" altLang="zh-CN" sz="4000" b="1" dirty="0" smtClean="0">
+                <a:latin typeface="+mj-lt"/>
+              </a:rPr>
+              <a:t>Redundancy</a:t>
             </a:r>
             <a:endParaRPr lang="zh-CN" altLang="en-US" sz="4000" b="1" dirty="0" smtClean="0">
               <a:latin typeface="+mj-lt"/>
@@ -18244,7 +18460,7 @@
     </p:spTree>
     <p:extLst>
       <p:ext uri="{BB962C8B-B14F-4D97-AF65-F5344CB8AC3E}">
-        <p14:creationId xmlns:p14="http://schemas.microsoft.com/office/powerpoint/2010/main" val="1418888918"/>
+        <p14:creationId xmlns:p14="http://schemas.microsoft.com/office/powerpoint/2010/main" val="2026475"/>
       </p:ext>
     </p:extLst>
   </p:cSld>
@@ -19014,8 +19230,8 @@
         </p:nvSpPr>
         <p:spPr>
           <a:xfrm>
-            <a:off x="765104" y="1124744"/>
-            <a:ext cx="4763227" cy="707886"/>
+            <a:off x="765104" y="764704"/>
+            <a:ext cx="6022803" cy="1323439"/>
           </a:xfrm>
           <a:prstGeom prst="rect">
             <a:avLst/>
@@ -19057,6 +19273,41 @@
                 <a:latin typeface="+mj-lt"/>
               </a:rPr>
               <a:t>Profiling</a:t>
+            </a:r>
+            <a:endParaRPr lang="zh-CN" altLang="en-US" sz="4000" b="1" dirty="0" smtClean="0">
+              <a:latin typeface="+mj-lt"/>
+            </a:endParaRPr>
+          </a:p>
+          <a:p>
+            <a:r>
+              <a:rPr lang="en-US" altLang="zh-CN" sz="4000" b="1" dirty="0" smtClean="0">
+                <a:latin typeface="+mj-lt"/>
+              </a:rPr>
+              <a:t>using</a:t>
+            </a:r>
+            <a:r>
+              <a:rPr lang="zh-CN" altLang="en-US" sz="4000" b="1" dirty="0" smtClean="0">
+                <a:latin typeface="+mj-lt"/>
+              </a:rPr>
+              <a:t> </a:t>
+            </a:r>
+            <a:r>
+              <a:rPr lang="en-US" altLang="zh-CN" sz="4000" b="1" dirty="0" smtClean="0">
+                <a:latin typeface="+mj-lt"/>
+              </a:rPr>
+              <a:t>Data</a:t>
+            </a:r>
+            <a:r>
+              <a:rPr lang="zh-CN" altLang="en-US" sz="4000" b="1" dirty="0" smtClean="0">
+                <a:latin typeface="+mj-lt"/>
+              </a:rPr>
+              <a:t> </a:t>
+            </a:r>
+            <a:r>
+              <a:rPr lang="en-US" altLang="zh-CN" sz="4000" b="1" dirty="0" smtClean="0">
+                <a:latin typeface="+mj-lt"/>
+              </a:rPr>
+              <a:t>Redundancy</a:t>
             </a:r>
             <a:endParaRPr lang="zh-CN" altLang="en-US" sz="4000" b="1" dirty="0" smtClean="0">
               <a:latin typeface="+mj-lt"/>
@@ -19206,7 +19457,7 @@
     </p:spTree>
     <p:extLst>
       <p:ext uri="{BB962C8B-B14F-4D97-AF65-F5344CB8AC3E}">
-        <p14:creationId xmlns:p14="http://schemas.microsoft.com/office/powerpoint/2010/main" val="143009579"/>
+        <p14:creationId xmlns:p14="http://schemas.microsoft.com/office/powerpoint/2010/main" val="1819205023"/>
       </p:ext>
     </p:extLst>
   </p:cSld>
@@ -21025,8 +21276,8 @@
         </p:nvSpPr>
         <p:spPr>
           <a:xfrm>
-            <a:off x="765104" y="1124744"/>
-            <a:ext cx="4763227" cy="707886"/>
+            <a:off x="765104" y="764704"/>
+            <a:ext cx="6022803" cy="1323439"/>
           </a:xfrm>
           <a:prstGeom prst="rect">
             <a:avLst/>
@@ -21068,6 +21319,41 @@
                 <a:latin typeface="+mj-lt"/>
               </a:rPr>
               <a:t>Profiling</a:t>
+            </a:r>
+            <a:endParaRPr lang="zh-CN" altLang="en-US" sz="4000" b="1" dirty="0" smtClean="0">
+              <a:latin typeface="+mj-lt"/>
+            </a:endParaRPr>
+          </a:p>
+          <a:p>
+            <a:r>
+              <a:rPr lang="en-US" altLang="zh-CN" sz="4000" b="1" dirty="0" smtClean="0">
+                <a:latin typeface="+mj-lt"/>
+              </a:rPr>
+              <a:t>using</a:t>
+            </a:r>
+            <a:r>
+              <a:rPr lang="zh-CN" altLang="en-US" sz="4000" b="1" dirty="0" smtClean="0">
+                <a:latin typeface="+mj-lt"/>
+              </a:rPr>
+              <a:t> </a:t>
+            </a:r>
+            <a:r>
+              <a:rPr lang="en-US" altLang="zh-CN" sz="4000" b="1" dirty="0" smtClean="0">
+                <a:latin typeface="+mj-lt"/>
+              </a:rPr>
+              <a:t>Data</a:t>
+            </a:r>
+            <a:r>
+              <a:rPr lang="zh-CN" altLang="en-US" sz="4000" b="1" dirty="0" smtClean="0">
+                <a:latin typeface="+mj-lt"/>
+              </a:rPr>
+              <a:t> </a:t>
+            </a:r>
+            <a:r>
+              <a:rPr lang="en-US" altLang="zh-CN" sz="4000" b="1" dirty="0" smtClean="0">
+                <a:latin typeface="+mj-lt"/>
+              </a:rPr>
+              <a:t>Redundancy</a:t>
             </a:r>
             <a:endParaRPr lang="zh-CN" altLang="en-US" sz="4000" b="1" dirty="0" smtClean="0">
               <a:latin typeface="+mj-lt"/>
@@ -21217,7 +21503,7 @@
     </p:spTree>
     <p:extLst>
       <p:ext uri="{BB962C8B-B14F-4D97-AF65-F5344CB8AC3E}">
-        <p14:creationId xmlns:p14="http://schemas.microsoft.com/office/powerpoint/2010/main" val="767279783"/>
+        <p14:creationId xmlns:p14="http://schemas.microsoft.com/office/powerpoint/2010/main" val="776077754"/>
       </p:ext>
     </p:extLst>
   </p:cSld>

</xml_diff>